<commit_message>
RavenDb talk cleaned up 2
</commit_message>
<xml_diff>
--- a/RavenDb/RavenDb.pptx
+++ b/RavenDb/RavenDb.pptx
@@ -7532,10 +7532,10 @@
               <a:t>нн</a:t>
             </a:r>
             <a:r>
-              <a:rPr lang="uk-UA"/>
+              <a:rPr lang="uk-UA" dirty="0"/>
               <a:t>і</a:t>
             </a:r>
-            <a:endParaRPr lang="uk-UA" smtClean="0"/>
+            <a:endParaRPr lang="uk-UA" dirty="0" smtClean="0"/>
           </a:p>
           <a:p>
             <a:r>

</xml_diff>